<commit_message>
Update Apresentação- Trabalho 3.pptx
done
</commit_message>
<xml_diff>
--- a/Apresentação- Trabalho 3.pptx
+++ b/Apresentação- Trabalho 3.pptx
@@ -4901,7 +4901,7 @@
         <p:spPr>
           <a:xfrm>
             <a:off x="311760" y="2424645"/>
-            <a:ext cx="4657060" cy="1477328"/>
+            <a:ext cx="4657060" cy="1754326"/>
           </a:xfrm>
           <a:prstGeom prst="rect">
             <a:avLst/>
@@ -4945,7 +4945,37 @@
                   </a:schemeClr>
                 </a:solidFill>
               </a:rPr>
-              <a:t>L = {W tal que W é o conjunto de todas as cadeias que terminam com um “c”}.</a:t>
+              <a:t>L = {W tal que W é o conjunto de todas as cadeias que terminam com um “c” em um alfabeto formado </a:t>
+            </a:r>
+            <a:r>
+              <a:rPr lang="pt-BR">
+                <a:solidFill>
+                  <a:schemeClr val="accent6">
+                    <a:lumMod val="75000"/>
+                  </a:schemeClr>
+                </a:solidFill>
+              </a:rPr>
+              <a:t>por {“</a:t>
+            </a:r>
+            <a:r>
+              <a:rPr lang="pt-BR" dirty="0" err="1">
+                <a:solidFill>
+                  <a:schemeClr val="accent6">
+                    <a:lumMod val="75000"/>
+                  </a:schemeClr>
+                </a:solidFill>
+              </a:rPr>
+              <a:t>a”,”b”,”c</a:t>
+            </a:r>
+            <a:r>
+              <a:rPr lang="pt-BR" dirty="0">
+                <a:solidFill>
+                  <a:schemeClr val="accent6">
+                    <a:lumMod val="75000"/>
+                  </a:schemeClr>
+                </a:solidFill>
+              </a:rPr>
+              <a:t>”}}.</a:t>
             </a:r>
           </a:p>
         </p:txBody>
@@ -5557,7 +5587,7 @@
                 <a:effectLst/>
                 <a:latin typeface="+mj-lt"/>
               </a:rPr>
-              <a:t>).</a:t>
+              <a:t>);</a:t>
             </a:r>
             <a:endParaRPr lang="pt-BR" sz="1800" b="0" strike="noStrike" spc="-1" dirty="0">
               <a:solidFill>
@@ -5588,7 +5618,7 @@
                 <a:latin typeface="Arial"/>
                 <a:ea typeface="Arial"/>
               </a:rPr>
-              <a:t>Foi desenvolvido na linguagem orientada a objetos Python.</a:t>
+              <a:t>Foi desenvolvido na linguagem orientada a objetos Python;</a:t>
             </a:r>
             <a:endParaRPr lang="pt-BR" sz="1800" b="0" strike="noStrike" spc="-1" dirty="0">
               <a:solidFill>
@@ -5636,7 +5666,7 @@
                 <a:latin typeface="Arial"/>
                 <a:ea typeface="Arial"/>
               </a:rPr>
-              <a:t>” para desenvolvermos a parte gráfica do programa.</a:t>
+              <a:t>” para desenvolvermos a parte gráfica do programa;</a:t>
             </a:r>
             <a:endParaRPr lang="pt-BR" sz="1800" b="0" strike="noStrike" spc="-1" dirty="0">
               <a:solidFill>
@@ -5834,7 +5864,7 @@
                 </a:solidFill>
                 <a:latin typeface="Arial"/>
               </a:rPr>
-              <a:t>Uso da estrutura árvore binária</a:t>
+              <a:t>Uso da estrutura árvore binária;</a:t>
             </a:r>
             <a:endParaRPr lang="pt-BR" sz="1800" b="0" strike="noStrike" spc="-1" dirty="0">
               <a:solidFill>
@@ -5862,7 +5892,7 @@
                 <a:latin typeface="Arial"/>
                 <a:ea typeface="Arial"/>
               </a:rPr>
-              <a:t>Uso da estrutura de dados dicionário “{ }”.</a:t>
+              <a:t>Uso da estrutura de dados dicionário “{ }”;</a:t>
             </a:r>
             <a:endParaRPr lang="pt-BR" sz="1800" b="0" strike="noStrike" spc="-1" dirty="0">
               <a:solidFill>
@@ -5890,7 +5920,7 @@
                 <a:latin typeface="Arial"/>
                 <a:ea typeface="Arial"/>
               </a:rPr>
-              <a:t>Uso da estrutura de dados lista “[ ]”.</a:t>
+              <a:t>Uso da estrutura de dados lista “[ ]”;</a:t>
             </a:r>
             <a:endParaRPr lang="pt-BR" sz="1800" b="0" strike="noStrike" spc="-1" dirty="0">
               <a:solidFill>
@@ -5918,7 +5948,17 @@
                 <a:latin typeface="Arial"/>
                 <a:ea typeface="Arial"/>
               </a:rPr>
-              <a:t>Uso de classes para representar o autômato.</a:t>
+              <a:t>Uso de classes para representar o autômato</a:t>
+            </a:r>
+            <a:r>
+              <a:rPr lang="pt-BR" spc="-1" dirty="0">
+                <a:solidFill>
+                  <a:srgbClr val="595959"/>
+                </a:solidFill>
+                <a:latin typeface="Arial"/>
+                <a:ea typeface="Arial"/>
+              </a:rPr>
+              <a:t>;</a:t>
             </a:r>
             <a:endParaRPr lang="pt-BR" sz="1800" b="0" strike="noStrike" spc="-1" dirty="0">
               <a:solidFill>
@@ -5946,7 +5986,7 @@
                 <a:latin typeface="Arial"/>
                 <a:ea typeface="Arial"/>
               </a:rPr>
-              <a:t>Uso da função set().</a:t>
+              <a:t>Uso da função set();</a:t>
             </a:r>
             <a:endParaRPr lang="pt-BR" sz="1800" b="0" strike="noStrike" spc="-1" dirty="0">
               <a:solidFill>
@@ -6104,7 +6144,7 @@
                 <a:latin typeface="Arial"/>
                 <a:ea typeface="Arial"/>
               </a:rPr>
-              <a:t>Primeiramente, o usuário fornece uma expressão regular na forma infixa como entrada para o algoritmo de conversão.</a:t>
+              <a:t>Primeiramente, o usuário fornece uma expressão regular na forma infixa como entrada para o algoritmo de conversão;</a:t>
             </a:r>
           </a:p>
           <a:p>
@@ -6146,23 +6186,14 @@
                 <a:latin typeface="Arial"/>
                 <a:ea typeface="Arial"/>
               </a:rPr>
-              <a:t> por meio do uso de uma estrutura de dados “árvore binária”</a:t>
-            </a:r>
-            <a:r>
-              <a:rPr lang="pt-BR" sz="1800" b="0" strike="noStrike" spc="-1" dirty="0">
-                <a:solidFill>
-                  <a:srgbClr val="595959"/>
-                </a:solidFill>
-                <a:latin typeface="Arial"/>
-                <a:ea typeface="Arial"/>
-              </a:rPr>
-              <a:t>.</a:t>
+              <a:t> por meio do uso de uma estrutura de dados pilha;</a:t>
             </a:r>
             <a:endParaRPr lang="pt-BR" sz="1800" b="0" strike="noStrike" spc="-1" dirty="0">
               <a:solidFill>
-                <a:srgbClr val="000000"/>
-              </a:solidFill>
-              <a:latin typeface="Arial"/>
+                <a:srgbClr val="595959"/>
+              </a:solidFill>
+              <a:latin typeface="Arial"/>
+              <a:ea typeface="Arial"/>
             </a:endParaRPr>
           </a:p>
           <a:p>
@@ -6177,6 +6208,61 @@
               <a:buChar char="●"/>
             </a:pPr>
             <a:r>
+              <a:rPr lang="pt-BR" spc="-1" dirty="0">
+                <a:solidFill>
+                  <a:srgbClr val="595959"/>
+                </a:solidFill>
+                <a:latin typeface="Arial"/>
+              </a:rPr>
+              <a:t>Uma árvore binária é criada a partir da expressão </a:t>
+            </a:r>
+            <a:r>
+              <a:rPr lang="pt-BR" spc="-1" dirty="0" err="1">
+                <a:solidFill>
+                  <a:srgbClr val="595959"/>
+                </a:solidFill>
+                <a:latin typeface="Arial"/>
+              </a:rPr>
+              <a:t>posfixa</a:t>
+            </a:r>
+            <a:r>
+              <a:rPr lang="pt-BR" spc="-1" dirty="0">
+                <a:solidFill>
+                  <a:srgbClr val="595959"/>
+                </a:solidFill>
+                <a:latin typeface="Arial"/>
+              </a:rPr>
+              <a:t>. Nela, os símbolos da expressão são representados como folhas e os operadores serão nós intermediários;</a:t>
+            </a:r>
+            <a:endParaRPr lang="pt-BR" sz="1800" b="0" strike="noStrike" spc="-1" dirty="0">
+              <a:solidFill>
+                <a:srgbClr val="000000"/>
+              </a:solidFill>
+              <a:latin typeface="Arial"/>
+            </a:endParaRPr>
+          </a:p>
+          <a:p>
+            <a:pPr marL="457200" indent="-342720">
+              <a:lnSpc>
+                <a:spcPct val="115000"/>
+              </a:lnSpc>
+              <a:buClr>
+                <a:srgbClr val="595959"/>
+              </a:buClr>
+              <a:buFont typeface="Arial"/>
+              <a:buChar char="●"/>
+            </a:pPr>
+            <a:r>
+              <a:rPr lang="pt-BR" spc="-1" dirty="0">
+                <a:solidFill>
+                  <a:srgbClr val="595959"/>
+                </a:solidFill>
+                <a:latin typeface="Arial"/>
+                <a:ea typeface="Arial"/>
+              </a:rPr>
+              <a:t>A</a:t>
+            </a:r>
+            <a:r>
               <a:rPr lang="pt-BR" sz="1800" b="0" strike="noStrike" spc="-1" dirty="0">
                 <a:solidFill>
                   <a:srgbClr val="595959"/>
@@ -6184,17 +6270,17 @@
                 <a:latin typeface="Arial"/>
                 <a:ea typeface="Arial"/>
               </a:rPr>
-              <a:t>Tendo a expressão em sua forma </a:t>
-            </a:r>
-            <a:r>
-              <a:rPr lang="pt-BR" sz="1800" b="0" strike="noStrike" spc="-1" dirty="0" err="1">
+              <a:t> </a:t>
+            </a:r>
+            <a:r>
+              <a:rPr lang="pt-BR" spc="-1" dirty="0">
                 <a:solidFill>
                   <a:srgbClr val="595959"/>
                 </a:solidFill>
                 <a:latin typeface="Arial"/>
                 <a:ea typeface="Arial"/>
               </a:rPr>
-              <a:t>posfixa</a:t>
+              <a:t>árvore é, então, percorrida</a:t>
             </a:r>
             <a:r>
               <a:rPr lang="pt-BR" sz="1800" b="0" strike="noStrike" spc="-1" dirty="0">
@@ -6204,7 +6290,7 @@
                 <a:latin typeface="Arial"/>
                 <a:ea typeface="Arial"/>
               </a:rPr>
-              <a:t>, a </a:t>
+              <a:t> de </a:t>
             </a:r>
             <a:r>
               <a:rPr lang="pt-BR" spc="-1" dirty="0">
@@ -6214,7 +6300,7 @@
                 <a:latin typeface="Arial"/>
                 <a:ea typeface="Arial"/>
               </a:rPr>
-              <a:t>árvore é percorrida</a:t>
+              <a:t>forma</a:t>
             </a:r>
             <a:r>
               <a:rPr lang="pt-BR" sz="1800" b="0" strike="noStrike" spc="-1" dirty="0">
@@ -6224,7 +6310,7 @@
                 <a:latin typeface="Arial"/>
                 <a:ea typeface="Arial"/>
               </a:rPr>
-              <a:t> de forma recursiva de modo que cada operador (união, concatenação ou fechamento) irá chamar sua função correspondente e irá aplica-la em seus nós filhos</a:t>
+              <a:t> recursiva de modo que cada operador (união, concatenação ou fechamento) irá chamar sua função correspondente e irá aplica-la em seus nós filhos</a:t>
             </a:r>
             <a:r>
               <a:rPr lang="pt-BR" spc="-1" dirty="0">
@@ -6480,7 +6566,7 @@
         <p:spPr>
           <a:xfrm>
             <a:off x="311760" y="2424645"/>
-            <a:ext cx="4657060" cy="1754326"/>
+            <a:ext cx="4657060" cy="2031325"/>
           </a:xfrm>
           <a:prstGeom prst="rect">
             <a:avLst/>
@@ -6524,7 +6610,7 @@
                   </a:schemeClr>
                 </a:solidFill>
               </a:rPr>
-              <a:t>L = {W tal que W é o conjunto de todas as cadeias que possuem ou um “b” ou no mínimo um “c”}.</a:t>
+              <a:t>L = {W tal que W é o conjunto de todas as cadeias que possuem sempre um “b” ou pelo menos um “c” e todos os “a” vem antes do “b” e este vem antes de todos os “c”}.</a:t>
             </a:r>
           </a:p>
         </p:txBody>
@@ -7077,7 +7163,7 @@
         <p:spPr>
           <a:xfrm>
             <a:off x="311760" y="2424645"/>
-            <a:ext cx="4657060" cy="1754326"/>
+            <a:ext cx="4657060" cy="2031325"/>
           </a:xfrm>
           <a:prstGeom prst="rect">
             <a:avLst/>
@@ -7121,7 +7207,7 @@
                   </a:schemeClr>
                 </a:solidFill>
               </a:rPr>
-              <a:t>L = {W tal que W é o conjunto de todas as cadeias que possuem no mínimo um “b” ou um “a”}.</a:t>
+              <a:t>L = {W tal que W é o conjunto de todas as cadeias que se iniciam com qualquer quantidade de “c” e possuem um “b” ou um “a” no final}.</a:t>
             </a:r>
           </a:p>
         </p:txBody>

</xml_diff>